<commit_message>
mitad de documentacion, presentacion 01122019, frontend, backend
</commit_message>
<xml_diff>
--- a/PRESENTACION APP INVENTARIOS.pptx
+++ b/PRESENTACION APP INVENTARIOS.pptx
@@ -19,10 +19,11 @@
     <p:sldId id="274" r:id="rId13"/>
     <p:sldId id="265" r:id="rId14"/>
     <p:sldId id="269" r:id="rId15"/>
-    <p:sldId id="270" r:id="rId16"/>
-    <p:sldId id="271" r:id="rId17"/>
-    <p:sldId id="272" r:id="rId18"/>
-    <p:sldId id="266" r:id="rId19"/>
+    <p:sldId id="281" r:id="rId16"/>
+    <p:sldId id="279" r:id="rId17"/>
+    <p:sldId id="280" r:id="rId18"/>
+    <p:sldId id="272" r:id="rId19"/>
+    <p:sldId id="266" r:id="rId20"/>
   </p:sldIdLst>
   <p:sldSz cx="12192000" cy="6858000"/>
   <p:notesSz cx="6858000" cy="9144000"/>
@@ -7488,7 +7489,7 @@
             <a:fld id="{B61BEF0D-F0BB-DE4B-95CE-6DB70DBA9567}" type="datetimeFigureOut">
               <a:rPr lang="en-US" smtClean="0"/>
               <a:pPr/>
-              <a:t>11/2/2019</a:t>
+              <a:t>11/30/2019</a:t>
             </a:fld>
             <a:endParaRPr lang="en-US" dirty="0"/>
           </a:p>
@@ -7698,7 +7699,7 @@
             <a:fld id="{B61BEF0D-F0BB-DE4B-95CE-6DB70DBA9567}" type="datetimeFigureOut">
               <a:rPr lang="en-US" smtClean="0"/>
               <a:pPr/>
-              <a:t>11/2/2019</a:t>
+              <a:t>11/30/2019</a:t>
             </a:fld>
             <a:endParaRPr lang="en-US" dirty="0"/>
           </a:p>
@@ -7956,7 +7957,7 @@
             <a:fld id="{B61BEF0D-F0BB-DE4B-95CE-6DB70DBA9567}" type="datetimeFigureOut">
               <a:rPr lang="en-US" smtClean="0"/>
               <a:pPr/>
-              <a:t>11/2/2019</a:t>
+              <a:t>11/30/2019</a:t>
             </a:fld>
             <a:endParaRPr lang="en-US" dirty="0"/>
           </a:p>
@@ -8128,7 +8129,7 @@
             <a:fld id="{B61BEF0D-F0BB-DE4B-95CE-6DB70DBA9567}" type="datetimeFigureOut">
               <a:rPr lang="en-US" smtClean="0"/>
               <a:pPr/>
-              <a:t>11/2/2019</a:t>
+              <a:t>11/30/2019</a:t>
             </a:fld>
             <a:endParaRPr lang="en-US" dirty="0"/>
           </a:p>
@@ -8473,7 +8474,7 @@
             <a:fld id="{B61BEF0D-F0BB-DE4B-95CE-6DB70DBA9567}" type="datetimeFigureOut">
               <a:rPr lang="en-US" smtClean="0"/>
               <a:pPr/>
-              <a:t>11/2/2019</a:t>
+              <a:t>11/30/2019</a:t>
             </a:fld>
             <a:endParaRPr lang="en-US" dirty="0"/>
           </a:p>
@@ -8750,7 +8751,7 @@
             <a:fld id="{B61BEF0D-F0BB-DE4B-95CE-6DB70DBA9567}" type="datetimeFigureOut">
               <a:rPr lang="en-US" smtClean="0"/>
               <a:pPr/>
-              <a:t>11/2/2019</a:t>
+              <a:t>11/30/2019</a:t>
             </a:fld>
             <a:endParaRPr lang="en-US" dirty="0"/>
           </a:p>
@@ -9131,7 +9132,7 @@
             <a:fld id="{B61BEF0D-F0BB-DE4B-95CE-6DB70DBA9567}" type="datetimeFigureOut">
               <a:rPr lang="en-US" smtClean="0"/>
               <a:pPr/>
-              <a:t>11/2/2019</a:t>
+              <a:t>11/30/2019</a:t>
             </a:fld>
             <a:endParaRPr lang="en-US" dirty="0"/>
           </a:p>
@@ -9251,7 +9252,7 @@
             <a:fld id="{B61BEF0D-F0BB-DE4B-95CE-6DB70DBA9567}" type="datetimeFigureOut">
               <a:rPr lang="en-US" smtClean="0"/>
               <a:pPr/>
-              <a:t>11/2/2019</a:t>
+              <a:t>11/30/2019</a:t>
             </a:fld>
             <a:endParaRPr lang="en-US" dirty="0"/>
           </a:p>
@@ -9424,7 +9425,7 @@
             <a:fld id="{B61BEF0D-F0BB-DE4B-95CE-6DB70DBA9567}" type="datetimeFigureOut">
               <a:rPr lang="en-US" smtClean="0"/>
               <a:pPr/>
-              <a:t>11/2/2019</a:t>
+              <a:t>11/30/2019</a:t>
             </a:fld>
             <a:endParaRPr lang="en-US" dirty="0"/>
           </a:p>
@@ -9780,7 +9781,7 @@
             <a:fld id="{B61BEF0D-F0BB-DE4B-95CE-6DB70DBA9567}" type="datetimeFigureOut">
               <a:rPr lang="en-US" smtClean="0"/>
               <a:pPr/>
-              <a:t>11/2/2019</a:t>
+              <a:t>11/30/2019</a:t>
             </a:fld>
             <a:endParaRPr lang="en-US" dirty="0"/>
           </a:p>
@@ -10159,7 +10160,7 @@
             <a:fld id="{B61BEF0D-F0BB-DE4B-95CE-6DB70DBA9567}" type="datetimeFigureOut">
               <a:rPr lang="en-US" smtClean="0"/>
               <a:pPr/>
-              <a:t>11/2/2019</a:t>
+              <a:t>11/30/2019</a:t>
             </a:fld>
             <a:endParaRPr lang="en-US" dirty="0"/>
           </a:p>
@@ -10448,7 +10449,7 @@
             <a:fld id="{B61BEF0D-F0BB-DE4B-95CE-6DB70DBA9567}" type="datetimeFigureOut">
               <a:rPr lang="en-US" smtClean="0"/>
               <a:pPr/>
-              <a:t>11/2/2019</a:t>
+              <a:t>11/30/2019</a:t>
             </a:fld>
             <a:endParaRPr lang="en-US" dirty="0"/>
           </a:p>
@@ -12068,7 +12069,7 @@
         <p:spPr>
           <a:xfrm>
             <a:off x="779886" y="653949"/>
-            <a:ext cx="5408879" cy="646331"/>
+            <a:ext cx="6389540" cy="646331"/>
           </a:xfrm>
           <a:prstGeom prst="rect">
             <a:avLst/>
@@ -12096,7 +12097,7 @@
                 <a:ea typeface="+mj-ea"/>
                 <a:cs typeface="+mj-cs"/>
               </a:rPr>
-              <a:t>6. PROTOTIPO (Usuario)</a:t>
+              <a:t>6. PROTOTIPO  VS  APLICACIÓN</a:t>
             </a:r>
             <a:endParaRPr lang="es-419" sz="3600" b="1" u="sng" dirty="0">
               <a:solidFill>
@@ -12113,6 +12114,216 @@
               <a:ea typeface="+mj-ea"/>
               <a:cs typeface="+mj-cs"/>
             </a:endParaRPr>
+          </a:p>
+        </p:txBody>
+      </p:sp>
+      <p:sp>
+        <p:nvSpPr>
+          <p:cNvPr id="6" name="Rectángulo 3">
+            <a:extLst>
+              <a:ext uri="{FF2B5EF4-FFF2-40B4-BE49-F238E27FC236}">
+                <a16:creationId xmlns:a16="http://schemas.microsoft.com/office/drawing/2014/main" id="{373805F4-BE10-4362-A141-E6907D4B1B86}"/>
+              </a:ext>
+            </a:extLst>
+          </p:cNvPr>
+          <p:cNvSpPr/>
+          <p:nvPr/>
+        </p:nvSpPr>
+        <p:spPr>
+          <a:xfrm>
+            <a:off x="9687338" y="653949"/>
+            <a:ext cx="1848679" cy="830997"/>
+          </a:xfrm>
+          <a:prstGeom prst="rect">
+            <a:avLst/>
+          </a:prstGeom>
+        </p:spPr>
+        <p:style>
+          <a:lnRef idx="3">
+            <a:schemeClr val="lt1"/>
+          </a:lnRef>
+          <a:fillRef idx="1">
+            <a:schemeClr val="accent2"/>
+          </a:fillRef>
+          <a:effectRef idx="1">
+            <a:schemeClr val="accent2"/>
+          </a:effectRef>
+          <a:fontRef idx="minor">
+            <a:schemeClr val="lt1"/>
+          </a:fontRef>
+        </p:style>
+        <p:txBody>
+          <a:bodyPr wrap="square">
+            <a:spAutoFit/>
+          </a:bodyPr>
+          <a:lstStyle/>
+          <a:p>
+            <a:pPr algn="ctr"/>
+            <a:r>
+              <a:rPr lang="es-MX" sz="4800" b="1" dirty="0">
+                <a:solidFill>
+                  <a:schemeClr val="bg1"/>
+                </a:solidFill>
+                <a:effectLst>
+                  <a:outerShdw blurRad="38100" dist="38100" dir="2700000" algn="tl">
+                    <a:srgbClr val="000000">
+                      <a:alpha val="43137"/>
+                    </a:srgbClr>
+                  </a:outerShdw>
+                </a:effectLst>
+                <a:latin typeface="+mj-lt"/>
+                <a:ea typeface="+mj-ea"/>
+                <a:cs typeface="+mj-cs"/>
+              </a:rPr>
+              <a:t>LOGIN</a:t>
+            </a:r>
+            <a:endParaRPr lang="es-419" sz="4800" b="1" dirty="0">
+              <a:solidFill>
+                <a:schemeClr val="bg1"/>
+              </a:solidFill>
+              <a:effectLst>
+                <a:outerShdw blurRad="38100" dist="38100" dir="2700000" algn="tl">
+                  <a:srgbClr val="000000">
+                    <a:alpha val="43137"/>
+                  </a:srgbClr>
+                </a:outerShdw>
+              </a:effectLst>
+              <a:latin typeface="+mj-lt"/>
+              <a:ea typeface="+mj-ea"/>
+              <a:cs typeface="+mj-cs"/>
+            </a:endParaRPr>
+          </a:p>
+        </p:txBody>
+      </p:sp>
+      <p:pic>
+        <p:nvPicPr>
+          <p:cNvPr id="7" name="Imagen 6">
+            <a:extLst>
+              <a:ext uri="{FF2B5EF4-FFF2-40B4-BE49-F238E27FC236}">
+                <a16:creationId xmlns:a16="http://schemas.microsoft.com/office/drawing/2014/main" id="{45AE49CC-DCD8-4E3F-ACFD-6738A6AF25E6}"/>
+              </a:ext>
+            </a:extLst>
+          </p:cNvPr>
+          <p:cNvPicPr>
+            <a:picLocks noChangeAspect="1"/>
+          </p:cNvPicPr>
+          <p:nvPr/>
+        </p:nvPicPr>
+        <p:blipFill>
+          <a:blip r:embed="rId2"/>
+          <a:stretch>
+            <a:fillRect/>
+          </a:stretch>
+        </p:blipFill>
+        <p:spPr>
+          <a:xfrm>
+            <a:off x="779886" y="1820724"/>
+            <a:ext cx="2295525" cy="4383327"/>
+          </a:xfrm>
+          <a:prstGeom prst="rect">
+            <a:avLst/>
+          </a:prstGeom>
+        </p:spPr>
+      </p:pic>
+      <p:pic>
+        <p:nvPicPr>
+          <p:cNvPr id="2" name="Imagen 1">
+            <a:extLst>
+              <a:ext uri="{FF2B5EF4-FFF2-40B4-BE49-F238E27FC236}">
+                <a16:creationId xmlns:a16="http://schemas.microsoft.com/office/drawing/2014/main" id="{E4EBEF3C-FD2E-4592-BD43-B742BEE64070}"/>
+              </a:ext>
+            </a:extLst>
+          </p:cNvPr>
+          <p:cNvPicPr>
+            <a:picLocks noChangeAspect="1"/>
+          </p:cNvPicPr>
+          <p:nvPr/>
+        </p:nvPicPr>
+        <p:blipFill>
+          <a:blip r:embed="rId3"/>
+          <a:stretch>
+            <a:fillRect/>
+          </a:stretch>
+        </p:blipFill>
+        <p:spPr>
+          <a:xfrm>
+            <a:off x="3484287" y="1820724"/>
+            <a:ext cx="2744236" cy="4386381"/>
+          </a:xfrm>
+          <a:prstGeom prst="rect">
+            <a:avLst/>
+          </a:prstGeom>
+        </p:spPr>
+      </p:pic>
+      <p:sp>
+        <p:nvSpPr>
+          <p:cNvPr id="8" name="CuadroTexto 7">
+            <a:extLst>
+              <a:ext uri="{FF2B5EF4-FFF2-40B4-BE49-F238E27FC236}">
+                <a16:creationId xmlns:a16="http://schemas.microsoft.com/office/drawing/2014/main" id="{D1B5A43C-A79C-4EE8-AE27-8539BFC044A2}"/>
+              </a:ext>
+            </a:extLst>
+          </p:cNvPr>
+          <p:cNvSpPr txBox="1"/>
+          <p:nvPr/>
+        </p:nvSpPr>
+        <p:spPr>
+          <a:xfrm>
+            <a:off x="6758609" y="2431878"/>
+            <a:ext cx="4333461" cy="2862322"/>
+          </a:xfrm>
+          <a:prstGeom prst="rect">
+            <a:avLst/>
+          </a:prstGeom>
+          <a:noFill/>
+        </p:spPr>
+        <p:txBody>
+          <a:bodyPr wrap="square" rtlCol="0">
+            <a:spAutoFit/>
+          </a:bodyPr>
+          <a:lstStyle/>
+          <a:p>
+            <a:r>
+              <a:rPr lang="es-CO" sz="2000" dirty="0"/>
+              <a:t>Solo cuenta con el </a:t>
+            </a:r>
+            <a:r>
+              <a:rPr lang="es-CO" sz="2000" dirty="0" err="1"/>
+              <a:t>Login</a:t>
+            </a:r>
+            <a:r>
+              <a:rPr lang="es-CO" sz="2000" dirty="0"/>
+              <a:t> ya que es el administrador el encargado de crear los usuarios para que el acceso a la aplicación sea más limitado y confidencial.</a:t>
+            </a:r>
+          </a:p>
+          <a:p>
+            <a:endParaRPr lang="es-CO" sz="2000" dirty="0"/>
+          </a:p>
+          <a:p>
+            <a:r>
+              <a:rPr lang="es-CO" sz="2000" dirty="0"/>
+              <a:t>Solicita los siguientes datos:</a:t>
+            </a:r>
+          </a:p>
+          <a:p>
+            <a:pPr marL="342900" indent="-342900">
+              <a:buFont typeface="Arial" panose="020B0604020202020204" pitchFamily="34" charset="0"/>
+              <a:buChar char="•"/>
+            </a:pPr>
+            <a:r>
+              <a:rPr lang="es-CO" sz="2000" dirty="0"/>
+              <a:t>Usuario</a:t>
+            </a:r>
+          </a:p>
+          <a:p>
+            <a:pPr marL="342900" indent="-342900">
+              <a:buFont typeface="Arial" panose="020B0604020202020204" pitchFamily="34" charset="0"/>
+              <a:buChar char="•"/>
+            </a:pPr>
+            <a:r>
+              <a:rPr lang="es-CO" sz="2000" dirty="0"/>
+              <a:t>Contraseña</a:t>
+            </a:r>
           </a:p>
         </p:txBody>
       </p:sp>
@@ -12155,7 +12366,7 @@
         <p:spPr>
           <a:xfrm>
             <a:off x="779886" y="653949"/>
-            <a:ext cx="6773853" cy="646331"/>
+            <a:ext cx="6389540" cy="646331"/>
           </a:xfrm>
           <a:prstGeom prst="rect">
             <a:avLst/>
@@ -12183,7 +12394,7 @@
                 <a:ea typeface="+mj-ea"/>
                 <a:cs typeface="+mj-cs"/>
               </a:rPr>
-              <a:t>PROTOTIPO (Administrador)</a:t>
+              <a:t>6. PROTOTIPO  VS  APLICACIÓN</a:t>
             </a:r>
             <a:endParaRPr lang="es-419" sz="3600" b="1" u="sng" dirty="0">
               <a:solidFill>
@@ -12203,10 +12414,268 @@
           </a:p>
         </p:txBody>
       </p:sp>
+      <p:pic>
+        <p:nvPicPr>
+          <p:cNvPr id="2" name="Imagen 1">
+            <a:extLst>
+              <a:ext uri="{FF2B5EF4-FFF2-40B4-BE49-F238E27FC236}">
+                <a16:creationId xmlns:a16="http://schemas.microsoft.com/office/drawing/2014/main" id="{9FF2F3FD-7B01-4730-A6EE-59325FF7473C}"/>
+              </a:ext>
+            </a:extLst>
+          </p:cNvPr>
+          <p:cNvPicPr>
+            <a:picLocks noChangeAspect="1"/>
+          </p:cNvPicPr>
+          <p:nvPr/>
+        </p:nvPicPr>
+        <p:blipFill>
+          <a:blip r:embed="rId2"/>
+          <a:stretch>
+            <a:fillRect/>
+          </a:stretch>
+        </p:blipFill>
+        <p:spPr>
+          <a:xfrm>
+            <a:off x="157033" y="1921566"/>
+            <a:ext cx="1711524" cy="4065104"/>
+          </a:xfrm>
+          <a:prstGeom prst="rect">
+            <a:avLst/>
+          </a:prstGeom>
+        </p:spPr>
+      </p:pic>
+      <p:pic>
+        <p:nvPicPr>
+          <p:cNvPr id="3" name="Imagen 2">
+            <a:extLst>
+              <a:ext uri="{FF2B5EF4-FFF2-40B4-BE49-F238E27FC236}">
+                <a16:creationId xmlns:a16="http://schemas.microsoft.com/office/drawing/2014/main" id="{6A1B2D8C-F900-4566-A275-70483E1DAA50}"/>
+              </a:ext>
+            </a:extLst>
+          </p:cNvPr>
+          <p:cNvPicPr>
+            <a:picLocks noChangeAspect="1"/>
+          </p:cNvPicPr>
+          <p:nvPr/>
+        </p:nvPicPr>
+        <p:blipFill>
+          <a:blip r:embed="rId3"/>
+          <a:stretch>
+            <a:fillRect/>
+          </a:stretch>
+        </p:blipFill>
+        <p:spPr>
+          <a:xfrm>
+            <a:off x="1976025" y="1904556"/>
+            <a:ext cx="1711524" cy="4082114"/>
+          </a:xfrm>
+          <a:prstGeom prst="rect">
+            <a:avLst/>
+          </a:prstGeom>
+        </p:spPr>
+      </p:pic>
+      <p:pic>
+        <p:nvPicPr>
+          <p:cNvPr id="4" name="Imagen 3">
+            <a:extLst>
+              <a:ext uri="{FF2B5EF4-FFF2-40B4-BE49-F238E27FC236}">
+                <a16:creationId xmlns:a16="http://schemas.microsoft.com/office/drawing/2014/main" id="{E5350101-B795-476A-BB6E-21516B6DDDEB}"/>
+              </a:ext>
+            </a:extLst>
+          </p:cNvPr>
+          <p:cNvPicPr>
+            <a:picLocks noChangeAspect="1"/>
+          </p:cNvPicPr>
+          <p:nvPr/>
+        </p:nvPicPr>
+        <p:blipFill>
+          <a:blip r:embed="rId4"/>
+          <a:stretch>
+            <a:fillRect/>
+          </a:stretch>
+        </p:blipFill>
+        <p:spPr>
+          <a:xfrm>
+            <a:off x="3795017" y="1904556"/>
+            <a:ext cx="1711525" cy="4082114"/>
+          </a:xfrm>
+          <a:prstGeom prst="rect">
+            <a:avLst/>
+          </a:prstGeom>
+        </p:spPr>
+      </p:pic>
+      <p:sp>
+        <p:nvSpPr>
+          <p:cNvPr id="6" name="Rectángulo 3">
+            <a:extLst>
+              <a:ext uri="{FF2B5EF4-FFF2-40B4-BE49-F238E27FC236}">
+                <a16:creationId xmlns:a16="http://schemas.microsoft.com/office/drawing/2014/main" id="{373805F4-BE10-4362-A141-E6907D4B1B86}"/>
+              </a:ext>
+            </a:extLst>
+          </p:cNvPr>
+          <p:cNvSpPr/>
+          <p:nvPr/>
+        </p:nvSpPr>
+        <p:spPr>
+          <a:xfrm>
+            <a:off x="9687338" y="653949"/>
+            <a:ext cx="1848679" cy="830997"/>
+          </a:xfrm>
+          <a:prstGeom prst="rect">
+            <a:avLst/>
+          </a:prstGeom>
+        </p:spPr>
+        <p:style>
+          <a:lnRef idx="3">
+            <a:schemeClr val="lt1"/>
+          </a:lnRef>
+          <a:fillRef idx="1">
+            <a:schemeClr val="accent2"/>
+          </a:fillRef>
+          <a:effectRef idx="1">
+            <a:schemeClr val="accent2"/>
+          </a:effectRef>
+          <a:fontRef idx="minor">
+            <a:schemeClr val="lt1"/>
+          </a:fontRef>
+        </p:style>
+        <p:txBody>
+          <a:bodyPr wrap="square">
+            <a:spAutoFit/>
+          </a:bodyPr>
+          <a:lstStyle/>
+          <a:p>
+            <a:pPr algn="ctr"/>
+            <a:r>
+              <a:rPr lang="es-MX" sz="4800" b="1" dirty="0">
+                <a:solidFill>
+                  <a:schemeClr val="bg1"/>
+                </a:solidFill>
+                <a:effectLst>
+                  <a:outerShdw blurRad="38100" dist="38100" dir="2700000" algn="tl">
+                    <a:srgbClr val="000000">
+                      <a:alpha val="43137"/>
+                    </a:srgbClr>
+                  </a:outerShdw>
+                </a:effectLst>
+                <a:latin typeface="+mj-lt"/>
+                <a:ea typeface="+mj-ea"/>
+                <a:cs typeface="+mj-cs"/>
+              </a:rPr>
+              <a:t>INICIO</a:t>
+            </a:r>
+            <a:endParaRPr lang="es-419" sz="4800" b="1" dirty="0">
+              <a:solidFill>
+                <a:schemeClr val="bg1"/>
+              </a:solidFill>
+              <a:effectLst>
+                <a:outerShdw blurRad="38100" dist="38100" dir="2700000" algn="tl">
+                  <a:srgbClr val="000000">
+                    <a:alpha val="43137"/>
+                  </a:srgbClr>
+                </a:outerShdw>
+              </a:effectLst>
+              <a:latin typeface="+mj-lt"/>
+              <a:ea typeface="+mj-ea"/>
+              <a:cs typeface="+mj-cs"/>
+            </a:endParaRPr>
+          </a:p>
+        </p:txBody>
+      </p:sp>
+      <p:pic>
+        <p:nvPicPr>
+          <p:cNvPr id="7" name="Imagen 6">
+            <a:extLst>
+              <a:ext uri="{FF2B5EF4-FFF2-40B4-BE49-F238E27FC236}">
+                <a16:creationId xmlns:a16="http://schemas.microsoft.com/office/drawing/2014/main" id="{863DDB1A-E779-405E-87A7-78DA796F75E2}"/>
+              </a:ext>
+            </a:extLst>
+          </p:cNvPr>
+          <p:cNvPicPr>
+            <a:picLocks noChangeAspect="1"/>
+          </p:cNvPicPr>
+          <p:nvPr/>
+        </p:nvPicPr>
+        <p:blipFill>
+          <a:blip r:embed="rId5"/>
+          <a:stretch>
+            <a:fillRect/>
+          </a:stretch>
+        </p:blipFill>
+        <p:spPr>
+          <a:xfrm>
+            <a:off x="5927525" y="1921566"/>
+            <a:ext cx="1984023" cy="4065104"/>
+          </a:xfrm>
+          <a:prstGeom prst="rect">
+            <a:avLst/>
+          </a:prstGeom>
+        </p:spPr>
+      </p:pic>
+      <p:pic>
+        <p:nvPicPr>
+          <p:cNvPr id="8" name="Imagen 7">
+            <a:extLst>
+              <a:ext uri="{FF2B5EF4-FFF2-40B4-BE49-F238E27FC236}">
+                <a16:creationId xmlns:a16="http://schemas.microsoft.com/office/drawing/2014/main" id="{923A724F-064B-430C-BA5B-8824345FA59C}"/>
+              </a:ext>
+            </a:extLst>
+          </p:cNvPr>
+          <p:cNvPicPr>
+            <a:picLocks noChangeAspect="1"/>
+          </p:cNvPicPr>
+          <p:nvPr/>
+        </p:nvPicPr>
+        <p:blipFill>
+          <a:blip r:embed="rId6"/>
+          <a:stretch>
+            <a:fillRect/>
+          </a:stretch>
+        </p:blipFill>
+        <p:spPr>
+          <a:xfrm>
+            <a:off x="8016530" y="1921567"/>
+            <a:ext cx="1984023" cy="4065104"/>
+          </a:xfrm>
+          <a:prstGeom prst="rect">
+            <a:avLst/>
+          </a:prstGeom>
+        </p:spPr>
+      </p:pic>
+      <p:pic>
+        <p:nvPicPr>
+          <p:cNvPr id="9" name="Imagen 8">
+            <a:extLst>
+              <a:ext uri="{FF2B5EF4-FFF2-40B4-BE49-F238E27FC236}">
+                <a16:creationId xmlns:a16="http://schemas.microsoft.com/office/drawing/2014/main" id="{E960658B-1A92-4044-90B1-AE61453453E2}"/>
+              </a:ext>
+            </a:extLst>
+          </p:cNvPr>
+          <p:cNvPicPr>
+            <a:picLocks noChangeAspect="1"/>
+          </p:cNvPicPr>
+          <p:nvPr/>
+        </p:nvPicPr>
+        <p:blipFill>
+          <a:blip r:embed="rId7"/>
+          <a:stretch>
+            <a:fillRect/>
+          </a:stretch>
+        </p:blipFill>
+        <p:spPr>
+          <a:xfrm>
+            <a:off x="10111465" y="1921567"/>
+            <a:ext cx="1984023" cy="4065104"/>
+          </a:xfrm>
+          <a:prstGeom prst="rect">
+            <a:avLst/>
+          </a:prstGeom>
+        </p:spPr>
+      </p:pic>
     </p:spTree>
     <p:extLst>
       <p:ext uri="{BB962C8B-B14F-4D97-AF65-F5344CB8AC3E}">
-        <p14:creationId xmlns:p14="http://schemas.microsoft.com/office/powerpoint/2010/main" val="3188662293"/>
+        <p14:creationId xmlns:p14="http://schemas.microsoft.com/office/powerpoint/2010/main" val="2167335646"/>
       </p:ext>
     </p:extLst>
   </p:cSld>
@@ -12217,6 +12686,652 @@
 </file>
 
 <file path=ppt/slides/slide16.xml><?xml version="1.0" encoding="utf-8"?>
+<p:sld xmlns:a="http://schemas.openxmlformats.org/drawingml/2006/main" xmlns:r="http://schemas.openxmlformats.org/officeDocument/2006/relationships" xmlns:p="http://schemas.openxmlformats.org/presentationml/2006/main">
+  <p:cSld>
+    <p:spTree>
+      <p:nvGrpSpPr>
+        <p:cNvPr id="1" name=""/>
+        <p:cNvGrpSpPr/>
+        <p:nvPr/>
+      </p:nvGrpSpPr>
+      <p:grpSpPr>
+        <a:xfrm>
+          <a:off x="0" y="0"/>
+          <a:ext cx="0" cy="0"/>
+          <a:chOff x="0" y="0"/>
+          <a:chExt cx="0" cy="0"/>
+        </a:xfrm>
+      </p:grpSpPr>
+      <p:sp>
+        <p:nvSpPr>
+          <p:cNvPr id="5" name="Rectángulo 3"/>
+          <p:cNvSpPr/>
+          <p:nvPr/>
+        </p:nvSpPr>
+        <p:spPr>
+          <a:xfrm>
+            <a:off x="779886" y="653949"/>
+            <a:ext cx="6389540" cy="646331"/>
+          </a:xfrm>
+          <a:prstGeom prst="rect">
+            <a:avLst/>
+          </a:prstGeom>
+        </p:spPr>
+        <p:txBody>
+          <a:bodyPr wrap="square">
+            <a:spAutoFit/>
+          </a:bodyPr>
+          <a:lstStyle/>
+          <a:p>
+            <a:r>
+              <a:rPr lang="es-MX" sz="3600" b="1" u="sng" dirty="0">
+                <a:solidFill>
+                  <a:schemeClr val="accent1"/>
+                </a:solidFill>
+                <a:effectLst>
+                  <a:outerShdw blurRad="38100" dist="38100" dir="2700000" algn="tl">
+                    <a:srgbClr val="000000">
+                      <a:alpha val="43137"/>
+                    </a:srgbClr>
+                  </a:outerShdw>
+                </a:effectLst>
+                <a:latin typeface="+mj-lt"/>
+                <a:ea typeface="+mj-ea"/>
+                <a:cs typeface="+mj-cs"/>
+              </a:rPr>
+              <a:t>6. PROTOTIPO  VS  APLICACIÓN</a:t>
+            </a:r>
+            <a:endParaRPr lang="es-419" sz="3600" b="1" u="sng" dirty="0">
+              <a:solidFill>
+                <a:schemeClr val="accent1"/>
+              </a:solidFill>
+              <a:effectLst>
+                <a:outerShdw blurRad="38100" dist="38100" dir="2700000" algn="tl">
+                  <a:srgbClr val="000000">
+                    <a:alpha val="43137"/>
+                  </a:srgbClr>
+                </a:outerShdw>
+              </a:effectLst>
+              <a:latin typeface="+mj-lt"/>
+              <a:ea typeface="+mj-ea"/>
+              <a:cs typeface="+mj-cs"/>
+            </a:endParaRPr>
+          </a:p>
+        </p:txBody>
+      </p:sp>
+      <p:pic>
+        <p:nvPicPr>
+          <p:cNvPr id="3" name="Imagen 2">
+            <a:extLst>
+              <a:ext uri="{FF2B5EF4-FFF2-40B4-BE49-F238E27FC236}">
+                <a16:creationId xmlns:a16="http://schemas.microsoft.com/office/drawing/2014/main" id="{AFFA60E0-6E3E-408A-8B45-EAD5F56EDCDE}"/>
+              </a:ext>
+            </a:extLst>
+          </p:cNvPr>
+          <p:cNvPicPr>
+            <a:picLocks noChangeAspect="1"/>
+          </p:cNvPicPr>
+          <p:nvPr/>
+        </p:nvPicPr>
+        <p:blipFill>
+          <a:blip r:embed="rId2"/>
+          <a:stretch>
+            <a:fillRect/>
+          </a:stretch>
+        </p:blipFill>
+        <p:spPr>
+          <a:xfrm>
+            <a:off x="779886" y="1825487"/>
+            <a:ext cx="2295525" cy="4378564"/>
+          </a:xfrm>
+          <a:prstGeom prst="rect">
+            <a:avLst/>
+          </a:prstGeom>
+        </p:spPr>
+      </p:pic>
+      <p:pic>
+        <p:nvPicPr>
+          <p:cNvPr id="2" name="Imagen 1">
+            <a:extLst>
+              <a:ext uri="{FF2B5EF4-FFF2-40B4-BE49-F238E27FC236}">
+                <a16:creationId xmlns:a16="http://schemas.microsoft.com/office/drawing/2014/main" id="{89D7B4DF-C2B0-4AB9-B839-A9CFDA1B14C1}"/>
+              </a:ext>
+            </a:extLst>
+          </p:cNvPr>
+          <p:cNvPicPr>
+            <a:picLocks noChangeAspect="1"/>
+          </p:cNvPicPr>
+          <p:nvPr/>
+        </p:nvPicPr>
+        <p:blipFill>
+          <a:blip r:embed="rId3"/>
+          <a:stretch>
+            <a:fillRect/>
+          </a:stretch>
+        </p:blipFill>
+        <p:spPr>
+          <a:xfrm>
+            <a:off x="3398355" y="1825487"/>
+            <a:ext cx="2295525" cy="4378564"/>
+          </a:xfrm>
+          <a:prstGeom prst="rect">
+            <a:avLst/>
+          </a:prstGeom>
+        </p:spPr>
+      </p:pic>
+      <p:sp>
+        <p:nvSpPr>
+          <p:cNvPr id="6" name="CuadroTexto 5">
+            <a:extLst>
+              <a:ext uri="{FF2B5EF4-FFF2-40B4-BE49-F238E27FC236}">
+                <a16:creationId xmlns:a16="http://schemas.microsoft.com/office/drawing/2014/main" id="{F21BDEAB-AB73-4941-B701-EF968AD88F7E}"/>
+              </a:ext>
+            </a:extLst>
+          </p:cNvPr>
+          <p:cNvSpPr txBox="1"/>
+          <p:nvPr/>
+        </p:nvSpPr>
+        <p:spPr>
+          <a:xfrm>
+            <a:off x="6758609" y="1968055"/>
+            <a:ext cx="4333461" cy="4093428"/>
+          </a:xfrm>
+          <a:prstGeom prst="rect">
+            <a:avLst/>
+          </a:prstGeom>
+          <a:noFill/>
+        </p:spPr>
+        <p:txBody>
+          <a:bodyPr wrap="square" rtlCol="0">
+            <a:spAutoFit/>
+          </a:bodyPr>
+          <a:lstStyle/>
+          <a:p>
+            <a:r>
+              <a:rPr lang="es-CO" sz="2000" dirty="0"/>
+              <a:t>En esta opción el usuario es la persona que realiza el cargue detallado de los eventos presentados al momento de trasladar pacientes. Registra la siguiente información:</a:t>
+            </a:r>
+          </a:p>
+          <a:p>
+            <a:endParaRPr lang="es-CO" sz="2000" dirty="0"/>
+          </a:p>
+          <a:p>
+            <a:pPr marL="285750" indent="-285750">
+              <a:buFont typeface="Arial" panose="020B0604020202020204" pitchFamily="34" charset="0"/>
+              <a:buChar char="•"/>
+            </a:pPr>
+            <a:r>
+              <a:rPr lang="es-CO" sz="2000" dirty="0"/>
+              <a:t>Nombres completos</a:t>
+            </a:r>
+          </a:p>
+          <a:p>
+            <a:pPr marL="285750" indent="-285750">
+              <a:buFont typeface="Arial" panose="020B0604020202020204" pitchFamily="34" charset="0"/>
+              <a:buChar char="•"/>
+            </a:pPr>
+            <a:r>
+              <a:rPr lang="es-CO" sz="2000" dirty="0"/>
+              <a:t>Tipo ID</a:t>
+            </a:r>
+          </a:p>
+          <a:p>
+            <a:pPr marL="285750" indent="-285750">
+              <a:buFont typeface="Arial" panose="020B0604020202020204" pitchFamily="34" charset="0"/>
+              <a:buChar char="•"/>
+            </a:pPr>
+            <a:r>
+              <a:rPr lang="es-CO" sz="2000" dirty="0"/>
+              <a:t>Número de documento</a:t>
+            </a:r>
+          </a:p>
+          <a:p>
+            <a:pPr marL="285750" indent="-285750">
+              <a:buFont typeface="Arial" panose="020B0604020202020204" pitchFamily="34" charset="0"/>
+              <a:buChar char="•"/>
+            </a:pPr>
+            <a:r>
+              <a:rPr lang="es-CO" sz="2000" dirty="0"/>
+              <a:t>Diagnóstico</a:t>
+            </a:r>
+          </a:p>
+          <a:p>
+            <a:pPr marL="285750" indent="-285750">
+              <a:buFont typeface="Arial" panose="020B0604020202020204" pitchFamily="34" charset="0"/>
+              <a:buChar char="•"/>
+            </a:pPr>
+            <a:r>
+              <a:rPr lang="es-CO" sz="2000" dirty="0"/>
+              <a:t>Registro producto</a:t>
+            </a:r>
+          </a:p>
+          <a:p>
+            <a:pPr marL="742950" lvl="1" indent="-285750">
+              <a:buFont typeface="Arial" panose="020B0604020202020204" pitchFamily="34" charset="0"/>
+              <a:buChar char="•"/>
+            </a:pPr>
+            <a:r>
+              <a:rPr lang="es-CO" sz="2000" dirty="0"/>
+              <a:t>Nombre</a:t>
+            </a:r>
+          </a:p>
+          <a:p>
+            <a:pPr marL="742950" lvl="1" indent="-285750">
+              <a:buFont typeface="Arial" panose="020B0604020202020204" pitchFamily="34" charset="0"/>
+              <a:buChar char="•"/>
+            </a:pPr>
+            <a:r>
+              <a:rPr lang="es-CO" sz="2000" dirty="0"/>
+              <a:t>Cantidad</a:t>
+            </a:r>
+          </a:p>
+        </p:txBody>
+      </p:sp>
+      <p:sp>
+        <p:nvSpPr>
+          <p:cNvPr id="7" name="Rectángulo 3">
+            <a:extLst>
+              <a:ext uri="{FF2B5EF4-FFF2-40B4-BE49-F238E27FC236}">
+                <a16:creationId xmlns:a16="http://schemas.microsoft.com/office/drawing/2014/main" id="{2FBB2A47-BA5F-47D6-BB52-6344F0968E53}"/>
+              </a:ext>
+            </a:extLst>
+          </p:cNvPr>
+          <p:cNvSpPr/>
+          <p:nvPr/>
+        </p:nvSpPr>
+        <p:spPr>
+          <a:xfrm>
+            <a:off x="9687338" y="653949"/>
+            <a:ext cx="1848679" cy="830997"/>
+          </a:xfrm>
+          <a:prstGeom prst="rect">
+            <a:avLst/>
+          </a:prstGeom>
+        </p:spPr>
+        <p:style>
+          <a:lnRef idx="3">
+            <a:schemeClr val="lt1"/>
+          </a:lnRef>
+          <a:fillRef idx="1">
+            <a:schemeClr val="accent2"/>
+          </a:fillRef>
+          <a:effectRef idx="1">
+            <a:schemeClr val="accent2"/>
+          </a:effectRef>
+          <a:fontRef idx="minor">
+            <a:schemeClr val="lt1"/>
+          </a:fontRef>
+        </p:style>
+        <p:txBody>
+          <a:bodyPr wrap="square">
+            <a:spAutoFit/>
+          </a:bodyPr>
+          <a:lstStyle/>
+          <a:p>
+            <a:pPr algn="ctr"/>
+            <a:r>
+              <a:rPr lang="es-MX" sz="2400" b="1" dirty="0">
+                <a:solidFill>
+                  <a:schemeClr val="bg1"/>
+                </a:solidFill>
+                <a:effectLst>
+                  <a:outerShdw blurRad="38100" dist="38100" dir="2700000" algn="tl">
+                    <a:srgbClr val="000000">
+                      <a:alpha val="43137"/>
+                    </a:srgbClr>
+                  </a:outerShdw>
+                </a:effectLst>
+                <a:latin typeface="+mj-lt"/>
+                <a:ea typeface="+mj-ea"/>
+                <a:cs typeface="+mj-cs"/>
+              </a:rPr>
+              <a:t>REGISTRO PACIENTE</a:t>
+            </a:r>
+            <a:endParaRPr lang="es-419" sz="2400" b="1" dirty="0">
+              <a:solidFill>
+                <a:schemeClr val="bg1"/>
+              </a:solidFill>
+              <a:effectLst>
+                <a:outerShdw blurRad="38100" dist="38100" dir="2700000" algn="tl">
+                  <a:srgbClr val="000000">
+                    <a:alpha val="43137"/>
+                  </a:srgbClr>
+                </a:outerShdw>
+              </a:effectLst>
+              <a:latin typeface="+mj-lt"/>
+              <a:ea typeface="+mj-ea"/>
+              <a:cs typeface="+mj-cs"/>
+            </a:endParaRPr>
+          </a:p>
+        </p:txBody>
+      </p:sp>
+    </p:spTree>
+    <p:extLst>
+      <p:ext uri="{BB962C8B-B14F-4D97-AF65-F5344CB8AC3E}">
+        <p14:creationId xmlns:p14="http://schemas.microsoft.com/office/powerpoint/2010/main" val="2302224956"/>
+      </p:ext>
+    </p:extLst>
+  </p:cSld>
+  <p:clrMapOvr>
+    <a:masterClrMapping/>
+  </p:clrMapOvr>
+</p:sld>
+</file>
+
+<file path=ppt/slides/slide17.xml><?xml version="1.0" encoding="utf-8"?>
+<p:sld xmlns:a="http://schemas.openxmlformats.org/drawingml/2006/main" xmlns:r="http://schemas.openxmlformats.org/officeDocument/2006/relationships" xmlns:p="http://schemas.openxmlformats.org/presentationml/2006/main">
+  <p:cSld>
+    <p:spTree>
+      <p:nvGrpSpPr>
+        <p:cNvPr id="1" name=""/>
+        <p:cNvGrpSpPr/>
+        <p:nvPr/>
+      </p:nvGrpSpPr>
+      <p:grpSpPr>
+        <a:xfrm>
+          <a:off x="0" y="0"/>
+          <a:ext cx="0" cy="0"/>
+          <a:chOff x="0" y="0"/>
+          <a:chExt cx="0" cy="0"/>
+        </a:xfrm>
+      </p:grpSpPr>
+      <p:sp>
+        <p:nvSpPr>
+          <p:cNvPr id="5" name="Rectángulo 3"/>
+          <p:cNvSpPr/>
+          <p:nvPr/>
+        </p:nvSpPr>
+        <p:spPr>
+          <a:xfrm>
+            <a:off x="779886" y="653949"/>
+            <a:ext cx="6389540" cy="646331"/>
+          </a:xfrm>
+          <a:prstGeom prst="rect">
+            <a:avLst/>
+          </a:prstGeom>
+        </p:spPr>
+        <p:txBody>
+          <a:bodyPr wrap="square">
+            <a:spAutoFit/>
+          </a:bodyPr>
+          <a:lstStyle/>
+          <a:p>
+            <a:r>
+              <a:rPr lang="es-MX" sz="3600" b="1" u="sng" dirty="0">
+                <a:solidFill>
+                  <a:schemeClr val="accent1"/>
+                </a:solidFill>
+                <a:effectLst>
+                  <a:outerShdw blurRad="38100" dist="38100" dir="2700000" algn="tl">
+                    <a:srgbClr val="000000">
+                      <a:alpha val="43137"/>
+                    </a:srgbClr>
+                  </a:outerShdw>
+                </a:effectLst>
+                <a:latin typeface="+mj-lt"/>
+                <a:ea typeface="+mj-ea"/>
+                <a:cs typeface="+mj-cs"/>
+              </a:rPr>
+              <a:t>6. PROTOTIPO  VS  APLICACIÓN</a:t>
+            </a:r>
+            <a:endParaRPr lang="es-419" sz="3600" b="1" u="sng" dirty="0">
+              <a:solidFill>
+                <a:schemeClr val="accent1"/>
+              </a:solidFill>
+              <a:effectLst>
+                <a:outerShdw blurRad="38100" dist="38100" dir="2700000" algn="tl">
+                  <a:srgbClr val="000000">
+                    <a:alpha val="43137"/>
+                  </a:srgbClr>
+                </a:outerShdw>
+              </a:effectLst>
+              <a:latin typeface="+mj-lt"/>
+              <a:ea typeface="+mj-ea"/>
+              <a:cs typeface="+mj-cs"/>
+            </a:endParaRPr>
+          </a:p>
+        </p:txBody>
+      </p:sp>
+      <p:pic>
+        <p:nvPicPr>
+          <p:cNvPr id="2" name="Imagen 1">
+            <a:extLst>
+              <a:ext uri="{FF2B5EF4-FFF2-40B4-BE49-F238E27FC236}">
+                <a16:creationId xmlns:a16="http://schemas.microsoft.com/office/drawing/2014/main" id="{5594D11F-BBE6-4C7A-9FCD-46A66EA5F3A9}"/>
+              </a:ext>
+            </a:extLst>
+          </p:cNvPr>
+          <p:cNvPicPr>
+            <a:picLocks noChangeAspect="1"/>
+          </p:cNvPicPr>
+          <p:nvPr/>
+        </p:nvPicPr>
+        <p:blipFill>
+          <a:blip r:embed="rId2"/>
+          <a:stretch>
+            <a:fillRect/>
+          </a:stretch>
+        </p:blipFill>
+        <p:spPr>
+          <a:xfrm>
+            <a:off x="779886" y="1981200"/>
+            <a:ext cx="2276475" cy="4222851"/>
+          </a:xfrm>
+          <a:prstGeom prst="rect">
+            <a:avLst/>
+          </a:prstGeom>
+        </p:spPr>
+      </p:pic>
+      <p:pic>
+        <p:nvPicPr>
+          <p:cNvPr id="3" name="Imagen 2">
+            <a:extLst>
+              <a:ext uri="{FF2B5EF4-FFF2-40B4-BE49-F238E27FC236}">
+                <a16:creationId xmlns:a16="http://schemas.microsoft.com/office/drawing/2014/main" id="{760CB31C-D08C-4E2E-97A8-8ED602FADFFB}"/>
+              </a:ext>
+            </a:extLst>
+          </p:cNvPr>
+          <p:cNvPicPr>
+            <a:picLocks noChangeAspect="1"/>
+          </p:cNvPicPr>
+          <p:nvPr/>
+        </p:nvPicPr>
+        <p:blipFill>
+          <a:blip r:embed="rId3"/>
+          <a:stretch>
+            <a:fillRect/>
+          </a:stretch>
+        </p:blipFill>
+        <p:spPr>
+          <a:xfrm>
+            <a:off x="3363360" y="1981200"/>
+            <a:ext cx="2276475" cy="4222851"/>
+          </a:xfrm>
+          <a:prstGeom prst="rect">
+            <a:avLst/>
+          </a:prstGeom>
+        </p:spPr>
+      </p:pic>
+      <p:sp>
+        <p:nvSpPr>
+          <p:cNvPr id="4" name="CuadroTexto 3">
+            <a:extLst>
+              <a:ext uri="{FF2B5EF4-FFF2-40B4-BE49-F238E27FC236}">
+                <a16:creationId xmlns:a16="http://schemas.microsoft.com/office/drawing/2014/main" id="{8AAB9584-8228-42B1-84CC-B590C60137A0}"/>
+              </a:ext>
+            </a:extLst>
+          </p:cNvPr>
+          <p:cNvSpPr txBox="1"/>
+          <p:nvPr/>
+        </p:nvSpPr>
+        <p:spPr>
+          <a:xfrm>
+            <a:off x="6758609" y="2266122"/>
+            <a:ext cx="4333461" cy="3477875"/>
+          </a:xfrm>
+          <a:prstGeom prst="rect">
+            <a:avLst/>
+          </a:prstGeom>
+          <a:noFill/>
+        </p:spPr>
+        <p:txBody>
+          <a:bodyPr wrap="square" rtlCol="0">
+            <a:spAutoFit/>
+          </a:bodyPr>
+          <a:lstStyle/>
+          <a:p>
+            <a:r>
+              <a:rPr lang="es-CO" sz="2000" dirty="0"/>
+              <a:t>En esta opción el farmaceuta es la persona que realiza el cargue de inventario con la respectiva autorización del administrador. Registra la siguiente información:</a:t>
+            </a:r>
+          </a:p>
+          <a:p>
+            <a:endParaRPr lang="es-CO" sz="2000" dirty="0"/>
+          </a:p>
+          <a:p>
+            <a:pPr marL="285750" indent="-285750">
+              <a:buFont typeface="Arial" panose="020B0604020202020204" pitchFamily="34" charset="0"/>
+              <a:buChar char="•"/>
+            </a:pPr>
+            <a:r>
+              <a:rPr lang="es-CO" sz="2000" dirty="0"/>
+              <a:t>Producto</a:t>
+            </a:r>
+          </a:p>
+          <a:p>
+            <a:pPr marL="285750" indent="-285750">
+              <a:buFont typeface="Arial" panose="020B0604020202020204" pitchFamily="34" charset="0"/>
+              <a:buChar char="•"/>
+            </a:pPr>
+            <a:r>
+              <a:rPr lang="es-CO" sz="2000" dirty="0"/>
+              <a:t>Registro INVIMA</a:t>
+            </a:r>
+          </a:p>
+          <a:p>
+            <a:pPr marL="285750" indent="-285750">
+              <a:buFont typeface="Arial" panose="020B0604020202020204" pitchFamily="34" charset="0"/>
+              <a:buChar char="•"/>
+            </a:pPr>
+            <a:r>
+              <a:rPr lang="es-CO" sz="2000" dirty="0"/>
+              <a:t>Cantidad</a:t>
+            </a:r>
+          </a:p>
+          <a:p>
+            <a:pPr marL="285750" indent="-285750">
+              <a:buFont typeface="Arial" panose="020B0604020202020204" pitchFamily="34" charset="0"/>
+              <a:buChar char="•"/>
+            </a:pPr>
+            <a:r>
+              <a:rPr lang="es-CO" sz="2000" dirty="0"/>
+              <a:t>Fecha elaboración</a:t>
+            </a:r>
+          </a:p>
+          <a:p>
+            <a:pPr marL="285750" indent="-285750">
+              <a:buFont typeface="Arial" panose="020B0604020202020204" pitchFamily="34" charset="0"/>
+              <a:buChar char="•"/>
+            </a:pPr>
+            <a:r>
+              <a:rPr lang="es-CO" sz="2000" dirty="0"/>
+              <a:t>Fecha vencimiento</a:t>
+            </a:r>
+          </a:p>
+        </p:txBody>
+      </p:sp>
+      <p:sp>
+        <p:nvSpPr>
+          <p:cNvPr id="6" name="Rectángulo 3">
+            <a:extLst>
+              <a:ext uri="{FF2B5EF4-FFF2-40B4-BE49-F238E27FC236}">
+                <a16:creationId xmlns:a16="http://schemas.microsoft.com/office/drawing/2014/main" id="{21B07DDC-60E2-4F6A-8A35-8A27B0EBA663}"/>
+              </a:ext>
+            </a:extLst>
+          </p:cNvPr>
+          <p:cNvSpPr/>
+          <p:nvPr/>
+        </p:nvSpPr>
+        <p:spPr>
+          <a:xfrm>
+            <a:off x="9687338" y="653949"/>
+            <a:ext cx="1848679" cy="830997"/>
+          </a:xfrm>
+          <a:prstGeom prst="rect">
+            <a:avLst/>
+          </a:prstGeom>
+        </p:spPr>
+        <p:style>
+          <a:lnRef idx="3">
+            <a:schemeClr val="lt1"/>
+          </a:lnRef>
+          <a:fillRef idx="1">
+            <a:schemeClr val="accent2"/>
+          </a:fillRef>
+          <a:effectRef idx="1">
+            <a:schemeClr val="accent2"/>
+          </a:effectRef>
+          <a:fontRef idx="minor">
+            <a:schemeClr val="lt1"/>
+          </a:fontRef>
+        </p:style>
+        <p:txBody>
+          <a:bodyPr wrap="square">
+            <a:spAutoFit/>
+          </a:bodyPr>
+          <a:lstStyle/>
+          <a:p>
+            <a:pPr algn="ctr"/>
+            <a:r>
+              <a:rPr lang="es-MX" sz="2400" b="1" dirty="0">
+                <a:solidFill>
+                  <a:schemeClr val="bg1"/>
+                </a:solidFill>
+                <a:effectLst>
+                  <a:outerShdw blurRad="38100" dist="38100" dir="2700000" algn="tl">
+                    <a:srgbClr val="000000">
+                      <a:alpha val="43137"/>
+                    </a:srgbClr>
+                  </a:outerShdw>
+                </a:effectLst>
+                <a:latin typeface="+mj-lt"/>
+                <a:ea typeface="+mj-ea"/>
+                <a:cs typeface="+mj-cs"/>
+              </a:rPr>
+              <a:t>Cargue Inventario</a:t>
+            </a:r>
+            <a:endParaRPr lang="es-419" sz="2400" b="1" dirty="0">
+              <a:solidFill>
+                <a:schemeClr val="bg1"/>
+              </a:solidFill>
+              <a:effectLst>
+                <a:outerShdw blurRad="38100" dist="38100" dir="2700000" algn="tl">
+                  <a:srgbClr val="000000">
+                    <a:alpha val="43137"/>
+                  </a:srgbClr>
+                </a:outerShdw>
+              </a:effectLst>
+              <a:latin typeface="+mj-lt"/>
+              <a:ea typeface="+mj-ea"/>
+              <a:cs typeface="+mj-cs"/>
+            </a:endParaRPr>
+          </a:p>
+        </p:txBody>
+      </p:sp>
+    </p:spTree>
+    <p:extLst>
+      <p:ext uri="{BB962C8B-B14F-4D97-AF65-F5344CB8AC3E}">
+        <p14:creationId xmlns:p14="http://schemas.microsoft.com/office/powerpoint/2010/main" val="3049203457"/>
+      </p:ext>
+    </p:extLst>
+  </p:cSld>
+  <p:clrMapOvr>
+    <a:masterClrMapping/>
+  </p:clrMapOvr>
+</p:sld>
+</file>
+
+<file path=ppt/slides/slide18.xml><?xml version="1.0" encoding="utf-8"?>
 <p:sld xmlns:a="http://schemas.openxmlformats.org/drawingml/2006/main" xmlns:r="http://schemas.openxmlformats.org/officeDocument/2006/relationships" xmlns:p="http://schemas.openxmlformats.org/presentationml/2006/main">
   <p:cSld>
     <p:spTree>
@@ -12270,94 +13385,7 @@
                 <a:ea typeface="+mj-ea"/>
                 <a:cs typeface="+mj-cs"/>
               </a:rPr>
-              <a:t>7. APLICACIÓN</a:t>
-            </a:r>
-            <a:endParaRPr lang="es-419" sz="3600" b="1" u="sng" dirty="0">
-              <a:solidFill>
-                <a:schemeClr val="accent1"/>
-              </a:solidFill>
-              <a:effectLst>
-                <a:outerShdw blurRad="38100" dist="38100" dir="2700000" algn="tl">
-                  <a:srgbClr val="000000">
-                    <a:alpha val="43137"/>
-                  </a:srgbClr>
-                </a:outerShdw>
-              </a:effectLst>
-              <a:latin typeface="+mj-lt"/>
-              <a:ea typeface="+mj-ea"/>
-              <a:cs typeface="+mj-cs"/>
-            </a:endParaRPr>
-          </a:p>
-        </p:txBody>
-      </p:sp>
-    </p:spTree>
-    <p:extLst>
-      <p:ext uri="{BB962C8B-B14F-4D97-AF65-F5344CB8AC3E}">
-        <p14:creationId xmlns:p14="http://schemas.microsoft.com/office/powerpoint/2010/main" val="2141538930"/>
-      </p:ext>
-    </p:extLst>
-  </p:cSld>
-  <p:clrMapOvr>
-    <a:masterClrMapping/>
-  </p:clrMapOvr>
-</p:sld>
-</file>
-
-<file path=ppt/slides/slide17.xml><?xml version="1.0" encoding="utf-8"?>
-<p:sld xmlns:a="http://schemas.openxmlformats.org/drawingml/2006/main" xmlns:r="http://schemas.openxmlformats.org/officeDocument/2006/relationships" xmlns:p="http://schemas.openxmlformats.org/presentationml/2006/main">
-  <p:cSld>
-    <p:spTree>
-      <p:nvGrpSpPr>
-        <p:cNvPr id="1" name=""/>
-        <p:cNvGrpSpPr/>
-        <p:nvPr/>
-      </p:nvGrpSpPr>
-      <p:grpSpPr>
-        <a:xfrm>
-          <a:off x="0" y="0"/>
-          <a:ext cx="0" cy="0"/>
-          <a:chOff x="0" y="0"/>
-          <a:chExt cx="0" cy="0"/>
-        </a:xfrm>
-      </p:grpSpPr>
-      <p:sp>
-        <p:nvSpPr>
-          <p:cNvPr id="5" name="Rectángulo 3"/>
-          <p:cNvSpPr/>
-          <p:nvPr/>
-        </p:nvSpPr>
-        <p:spPr>
-          <a:xfrm>
-            <a:off x="779886" y="653949"/>
-            <a:ext cx="6773853" cy="646331"/>
-          </a:xfrm>
-          <a:prstGeom prst="rect">
-            <a:avLst/>
-          </a:prstGeom>
-        </p:spPr>
-        <p:txBody>
-          <a:bodyPr wrap="square">
-            <a:spAutoFit/>
-          </a:bodyPr>
-          <a:lstStyle/>
-          <a:p>
-            <a:r>
-              <a:rPr lang="es-MX" sz="3600" b="1" u="sng" dirty="0">
-                <a:solidFill>
-                  <a:schemeClr val="accent1"/>
-                </a:solidFill>
-                <a:effectLst>
-                  <a:outerShdw blurRad="38100" dist="38100" dir="2700000" algn="tl">
-                    <a:srgbClr val="000000">
-                      <a:alpha val="43137"/>
-                    </a:srgbClr>
-                  </a:outerShdw>
-                </a:effectLst>
-                <a:latin typeface="+mj-lt"/>
-                <a:ea typeface="+mj-ea"/>
-                <a:cs typeface="+mj-cs"/>
-              </a:rPr>
-              <a:t>8. CONCLUSIÓN</a:t>
+              <a:t>7. CONCLUSIÓN</a:t>
             </a:r>
             <a:endParaRPr lang="es-419" sz="3600" b="1" u="sng" dirty="0">
               <a:solidFill>
@@ -12432,7 +13460,7 @@
 </p:sld>
 </file>
 
-<file path=ppt/slides/slide18.xml><?xml version="1.0" encoding="utf-8"?>
+<file path=ppt/slides/slide19.xml><?xml version="1.0" encoding="utf-8"?>
 <p:sld xmlns:a="http://schemas.openxmlformats.org/drawingml/2006/main" xmlns:r="http://schemas.openxmlformats.org/officeDocument/2006/relationships" xmlns:p="http://schemas.openxmlformats.org/presentationml/2006/main">
   <p:cSld>
     <p:spTree>
@@ -12579,7 +13607,7 @@
         </p:spPr>
         <p:txBody>
           <a:bodyPr>
-            <a:normAutofit lnSpcReduction="10000"/>
+            <a:normAutofit/>
           </a:bodyPr>
           <a:lstStyle/>
           <a:p>
@@ -12663,21 +13691,7 @@
                   <a:schemeClr val="tx1"/>
                 </a:solidFill>
               </a:rPr>
-              <a:t>Prototipo</a:t>
-            </a:r>
-          </a:p>
-          <a:p>
-            <a:pPr marL="514350" indent="-514350">
-              <a:buFont typeface="+mj-lt"/>
-              <a:buAutoNum type="arabicPeriod"/>
-            </a:pPr>
-            <a:r>
-              <a:rPr lang="es-MX" sz="3000" b="1" dirty="0">
-                <a:solidFill>
-                  <a:schemeClr val="tx1"/>
-                </a:solidFill>
-              </a:rPr>
-              <a:t>Aplicación</a:t>
+              <a:t>Prototipo vs Aplicación</a:t>
             </a:r>
           </a:p>
           <a:p>

</xml_diff>